<commit_message>
updated page on contributing
git-svn-id: https://svn.apache.org/repos/asf/isis/site/trunk@1492280 13f79535-47bb-0310-9956-ffa450edef68
</commit_message>
<xml_diff>
--- a/content/contributors/resources/git-workflow.pptx
+++ b/content/contributors/resources/git-workflow.pptx
@@ -107,7 +107,7 @@
   </p:defaultTextStyle>
   <p:extLst>
     <p:ext uri="{EFAFB233-063F-42B5-8137-9DF3F51BA10A}">
-      <p15:sldGuideLst xmlns:p15="http://schemas.microsoft.com/office/powerpoint/2012/main"/>
+      <p15:sldGuideLst xmlns:p15="http://schemas.microsoft.com/office/powerpoint/2012/main" xmlns=""/>
     </p:ext>
   </p:extLst>
 </p:presentation>
@@ -244,7 +244,7 @@
           <a:p>
             <a:fld id="{EA4A70C8-4F78-455D-BEBD-FAD3400884CB}" type="datetimeFigureOut">
               <a:rPr lang="en-US" smtClean="0"/>
-              <a:t>12/14/2012</a:t>
+              <a:t>6/12/2013</a:t>
             </a:fld>
             <a:endParaRPr lang="en-US"/>
           </a:p>
@@ -414,7 +414,7 @@
           <a:p>
             <a:fld id="{EA4A70C8-4F78-455D-BEBD-FAD3400884CB}" type="datetimeFigureOut">
               <a:rPr lang="en-US" smtClean="0"/>
-              <a:t>12/14/2012</a:t>
+              <a:t>6/12/2013</a:t>
             </a:fld>
             <a:endParaRPr lang="en-US"/>
           </a:p>
@@ -594,7 +594,7 @@
           <a:p>
             <a:fld id="{EA4A70C8-4F78-455D-BEBD-FAD3400884CB}" type="datetimeFigureOut">
               <a:rPr lang="en-US" smtClean="0"/>
-              <a:t>12/14/2012</a:t>
+              <a:t>6/12/2013</a:t>
             </a:fld>
             <a:endParaRPr lang="en-US"/>
           </a:p>
@@ -764,7 +764,7 @@
           <a:p>
             <a:fld id="{EA4A70C8-4F78-455D-BEBD-FAD3400884CB}" type="datetimeFigureOut">
               <a:rPr lang="en-US" smtClean="0"/>
-              <a:t>12/14/2012</a:t>
+              <a:t>6/12/2013</a:t>
             </a:fld>
             <a:endParaRPr lang="en-US"/>
           </a:p>
@@ -1010,7 +1010,7 @@
           <a:p>
             <a:fld id="{EA4A70C8-4F78-455D-BEBD-FAD3400884CB}" type="datetimeFigureOut">
               <a:rPr lang="en-US" smtClean="0"/>
-              <a:t>12/14/2012</a:t>
+              <a:t>6/12/2013</a:t>
             </a:fld>
             <a:endParaRPr lang="en-US"/>
           </a:p>
@@ -1242,7 +1242,7 @@
           <a:p>
             <a:fld id="{EA4A70C8-4F78-455D-BEBD-FAD3400884CB}" type="datetimeFigureOut">
               <a:rPr lang="en-US" smtClean="0"/>
-              <a:t>12/14/2012</a:t>
+              <a:t>6/12/2013</a:t>
             </a:fld>
             <a:endParaRPr lang="en-US"/>
           </a:p>
@@ -1609,7 +1609,7 @@
           <a:p>
             <a:fld id="{EA4A70C8-4F78-455D-BEBD-FAD3400884CB}" type="datetimeFigureOut">
               <a:rPr lang="en-US" smtClean="0"/>
-              <a:t>12/14/2012</a:t>
+              <a:t>6/12/2013</a:t>
             </a:fld>
             <a:endParaRPr lang="en-US"/>
           </a:p>
@@ -1727,7 +1727,7 @@
           <a:p>
             <a:fld id="{EA4A70C8-4F78-455D-BEBD-FAD3400884CB}" type="datetimeFigureOut">
               <a:rPr lang="en-US" smtClean="0"/>
-              <a:t>12/14/2012</a:t>
+              <a:t>6/12/2013</a:t>
             </a:fld>
             <a:endParaRPr lang="en-US"/>
           </a:p>
@@ -1822,7 +1822,7 @@
           <a:p>
             <a:fld id="{EA4A70C8-4F78-455D-BEBD-FAD3400884CB}" type="datetimeFigureOut">
               <a:rPr lang="en-US" smtClean="0"/>
-              <a:t>12/14/2012</a:t>
+              <a:t>6/12/2013</a:t>
             </a:fld>
             <a:endParaRPr lang="en-US"/>
           </a:p>
@@ -2099,7 +2099,7 @@
           <a:p>
             <a:fld id="{EA4A70C8-4F78-455D-BEBD-FAD3400884CB}" type="datetimeFigureOut">
               <a:rPr lang="en-US" smtClean="0"/>
-              <a:t>12/14/2012</a:t>
+              <a:t>6/12/2013</a:t>
             </a:fld>
             <a:endParaRPr lang="en-US"/>
           </a:p>
@@ -2352,7 +2352,7 @@
           <a:p>
             <a:fld id="{EA4A70C8-4F78-455D-BEBD-FAD3400884CB}" type="datetimeFigureOut">
               <a:rPr lang="en-US" smtClean="0"/>
-              <a:t>12/14/2012</a:t>
+              <a:t>6/12/2013</a:t>
             </a:fld>
             <a:endParaRPr lang="en-US"/>
           </a:p>
@@ -2565,7 +2565,7 @@
           <a:p>
             <a:fld id="{EA4A70C8-4F78-455D-BEBD-FAD3400884CB}" type="datetimeFigureOut">
               <a:rPr lang="en-US" smtClean="0"/>
-              <a:t>12/14/2012</a:t>
+              <a:t>6/12/2013</a:t>
             </a:fld>
             <a:endParaRPr lang="en-US"/>
           </a:p>
@@ -3758,18 +3758,18 @@
           <p:cNvPr id="42" name="Curved Connector 41"/>
           <p:cNvCxnSpPr>
             <a:stCxn id="7" idx="2"/>
-            <a:endCxn id="9" idx="4"/>
+            <a:endCxn id="30" idx="3"/>
           </p:cNvCxnSpPr>
           <p:nvPr/>
         </p:nvCxnSpPr>
         <p:spPr>
           <a:xfrm rot="10800000" flipV="1">
-            <a:off x="2295836" y="3384055"/>
-            <a:ext cx="3980665" cy="2041943"/>
+            <a:off x="4890418" y="3384056"/>
+            <a:ext cx="1386083" cy="2286530"/>
           </a:xfrm>
           <a:prstGeom prst="curvedConnector3">
             <a:avLst>
-              <a:gd name="adj1" fmla="val 50000"/>
+              <a:gd name="adj1" fmla="val 71054"/>
             </a:avLst>
           </a:prstGeom>
           <a:ln w="28575">
@@ -4066,48 +4066,6 @@
             <a:r>
               <a:rPr lang="en-GB" sz="1400" dirty="0" smtClean="0"/>
               <a:t>clone</a:t>
-            </a:r>
-            <a:endParaRPr lang="en-US" sz="1400" dirty="0"/>
-          </a:p>
-        </p:txBody>
-      </p:sp>
-      <p:sp>
-        <p:nvSpPr>
-          <p:cNvPr id="59" name="TextBox 58"/>
-          <p:cNvSpPr txBox="1"/>
-          <p:nvPr/>
-        </p:nvSpPr>
-        <p:spPr>
-          <a:xfrm>
-            <a:off x="3062013" y="4639419"/>
-            <a:ext cx="601448" cy="523220"/>
-          </a:xfrm>
-          <a:prstGeom prst="rect">
-            <a:avLst/>
-          </a:prstGeom>
-          <a:noFill/>
-        </p:spPr>
-        <p:txBody>
-          <a:bodyPr wrap="none" rtlCol="0">
-            <a:spAutoFit/>
-          </a:bodyPr>
-          <a:lstStyle/>
-          <a:p>
-            <a:pPr algn="ctr"/>
-            <a:r>
-              <a:rPr lang="en-GB" sz="1400" dirty="0"/>
-              <a:t>a</a:t>
-            </a:r>
-            <a:r>
-              <a:rPr lang="en-GB" sz="1400" dirty="0" smtClean="0"/>
-              <a:t>pply</a:t>
-            </a:r>
-            <a:br>
-              <a:rPr lang="en-GB" sz="1400" dirty="0" smtClean="0"/>
-            </a:br>
-            <a:r>
-              <a:rPr lang="en-GB" sz="1400" dirty="0" smtClean="0"/>
-              <a:t>patch</a:t>
             </a:r>
             <a:endParaRPr lang="en-US" sz="1400" dirty="0"/>
           </a:p>
@@ -4154,6 +4112,117 @@
               <a:t>JIRA</a:t>
             </a:r>
             <a:endParaRPr lang="en-US" dirty="0"/>
+          </a:p>
+        </p:txBody>
+      </p:sp>
+      <p:sp>
+        <p:nvSpPr>
+          <p:cNvPr id="30" name="Flowchart: Document 29"/>
+          <p:cNvSpPr/>
+          <p:nvPr/>
+        </p:nvSpPr>
+        <p:spPr>
+          <a:xfrm>
+            <a:off x="4322796" y="5413893"/>
+            <a:ext cx="567621" cy="513386"/>
+          </a:xfrm>
+          <a:prstGeom prst="flowChartDocument">
+            <a:avLst/>
+          </a:prstGeom>
+        </p:spPr>
+        <p:style>
+          <a:lnRef idx="2">
+            <a:schemeClr val="accent5">
+              <a:shade val="50000"/>
+            </a:schemeClr>
+          </a:lnRef>
+          <a:fillRef idx="1">
+            <a:schemeClr val="accent5"/>
+          </a:fillRef>
+          <a:effectRef idx="0">
+            <a:schemeClr val="accent5"/>
+          </a:effectRef>
+          <a:fontRef idx="minor">
+            <a:schemeClr val="lt1"/>
+          </a:fontRef>
+        </p:style>
+        <p:txBody>
+          <a:bodyPr rtlCol="0" anchor="ctr"/>
+          <a:lstStyle/>
+          <a:p>
+            <a:pPr algn="ctr"/>
+            <a:r>
+              <a:rPr lang="en-GB" sz="1100" dirty="0" smtClean="0"/>
+              <a:t>patch</a:t>
+            </a:r>
+            <a:endParaRPr lang="en-US" sz="1100" dirty="0"/>
+          </a:p>
+        </p:txBody>
+      </p:sp>
+      <p:cxnSp>
+        <p:nvCxnSpPr>
+          <p:cNvPr id="31" name="Curved Connector 30"/>
+          <p:cNvCxnSpPr/>
+          <p:nvPr/>
+        </p:nvCxnSpPr>
+        <p:spPr>
+          <a:xfrm rot="10800000" flipV="1">
+            <a:off x="2295836" y="5305737"/>
+            <a:ext cx="1685905" cy="120261"/>
+          </a:xfrm>
+          <a:prstGeom prst="curvedConnector3">
+            <a:avLst>
+              <a:gd name="adj1" fmla="val 50000"/>
+            </a:avLst>
+          </a:prstGeom>
+          <a:ln w="28575">
+            <a:prstDash val="dashDot"/>
+            <a:tailEnd type="triangle" w="lg" len="lg"/>
+          </a:ln>
+        </p:spPr>
+        <p:style>
+          <a:lnRef idx="1">
+            <a:schemeClr val="accent1"/>
+          </a:lnRef>
+          <a:fillRef idx="0">
+            <a:schemeClr val="accent1"/>
+          </a:fillRef>
+          <a:effectRef idx="0">
+            <a:schemeClr val="accent1"/>
+          </a:effectRef>
+          <a:fontRef idx="minor">
+            <a:schemeClr val="tx1"/>
+          </a:fontRef>
+        </p:style>
+      </p:cxnSp>
+      <p:sp>
+        <p:nvSpPr>
+          <p:cNvPr id="32" name="TextBox 31"/>
+          <p:cNvSpPr txBox="1"/>
+          <p:nvPr/>
+        </p:nvSpPr>
+        <p:spPr>
+          <a:xfrm>
+            <a:off x="2957017" y="4911803"/>
+            <a:ext cx="811441" cy="307777"/>
+          </a:xfrm>
+          <a:prstGeom prst="rect">
+            <a:avLst/>
+          </a:prstGeom>
+          <a:noFill/>
+        </p:spPr>
+        <p:txBody>
+          <a:bodyPr wrap="none" rtlCol="0">
+            <a:spAutoFit/>
+          </a:bodyPr>
+          <a:lstStyle/>
+          <a:p>
+            <a:pPr algn="ctr"/>
+            <a:r>
+              <a:rPr lang="en-GB" sz="1400" dirty="0" smtClean="0"/>
+              <a:t>git apply</a:t>
+            </a:r>
+            <a:endParaRPr lang="en-US" sz="1400" dirty="0"/>
           </a:p>
         </p:txBody>
       </p:sp>
@@ -5024,8 +5093,8 @@
         </p:nvSpPr>
         <p:spPr>
           <a:xfrm>
-            <a:off x="5251526" y="5210310"/>
-            <a:ext cx="655821" cy="307777"/>
+            <a:off x="4942474" y="5171398"/>
+            <a:ext cx="1371209" cy="307777"/>
           </a:xfrm>
           <a:prstGeom prst="rect">
             <a:avLst/>
@@ -5045,7 +5114,7 @@
             </a:r>
             <a:r>
               <a:rPr lang="en-GB" sz="1400" dirty="0" smtClean="0"/>
-              <a:t>diff</a:t>
+              <a:t>format-patch</a:t>
             </a:r>
             <a:endParaRPr lang="en-US" sz="1400" dirty="0"/>
           </a:p>
@@ -5135,8 +5204,8 @@
         </p:nvSpPr>
         <p:spPr>
           <a:xfrm>
-            <a:off x="3062013" y="4639419"/>
-            <a:ext cx="601448" cy="523220"/>
+            <a:off x="2957017" y="4911803"/>
+            <a:ext cx="811441" cy="307777"/>
           </a:xfrm>
           <a:prstGeom prst="rect">
             <a:avLst/>
@@ -5151,19 +5220,8 @@
           <a:p>
             <a:pPr algn="ctr"/>
             <a:r>
-              <a:rPr lang="en-GB" sz="1400" dirty="0"/>
-              <a:t>a</a:t>
-            </a:r>
-            <a:r>
               <a:rPr lang="en-GB" sz="1400" dirty="0" smtClean="0"/>
-              <a:t>pply</a:t>
-            </a:r>
-            <a:br>
-              <a:rPr lang="en-GB" sz="1400" dirty="0" smtClean="0"/>
-            </a:br>
-            <a:r>
-              <a:rPr lang="en-GB" sz="1400" dirty="0" smtClean="0"/>
-              <a:t>patch</a:t>
+              <a:t>git apply</a:t>
             </a:r>
             <a:endParaRPr lang="en-US" sz="1400" dirty="0"/>
           </a:p>
@@ -5313,7 +5371,7 @@
     </a:clrScheme>
     <a:fontScheme name="Office">
       <a:majorFont>
-        <a:latin typeface="Calibri Light" panose="020F0302020204030204"/>
+        <a:latin typeface="Calibri Light"/>
         <a:ea typeface=""/>
         <a:cs typeface=""/>
         <a:font script="Jpan" typeface="ＭＳ Ｐゴシック"/>
@@ -5348,7 +5406,7 @@
         <a:font script="Geor" typeface="Sylfaen"/>
       </a:majorFont>
       <a:minorFont>
-        <a:latin typeface="Calibri" panose="020F0502020204030204"/>
+        <a:latin typeface="Calibri"/>
         <a:ea typeface=""/>
         <a:cs typeface=""/>
         <a:font script="Jpan" typeface="ＭＳ Ｐゴシック"/>
@@ -5525,7 +5583,7 @@
   <a:extraClrSchemeLst/>
   <a:extLst>
     <a:ext uri="{05A4C25C-085E-4340-85A3-A5531E510DB2}">
-      <thm15:themeFamily xmlns:thm15="http://schemas.microsoft.com/office/thememl/2012/main" name="Office Theme" id="{62F939B6-93AF-4DB8-9C6B-D6C7DFDC589F}" vid="{4A3C46E8-61CC-4603-A589-7422A47A8E4A}"/>
+      <thm15:themeFamily xmlns:thm15="http://schemas.microsoft.com/office/thememl/2012/main" xmlns="" name="Office Theme" id="{62F939B6-93AF-4DB8-9C6B-D6C7DFDC589F}" vid="{4A3C46E8-61CC-4603-A589-7422A47A8E4A}"/>
     </a:ext>
   </a:extLst>
 </a:theme>

</xml_diff>

<commit_message>
updating contributor process, more emphasis on github PRs
git-svn-id: https://svn.apache.org/repos/asf/isis/site/trunk@1632288 13f79535-47bb-0310-9956-ffa450edef68
</commit_message>
<xml_diff>
--- a/content/contributors/resources/git-workflow.pptx
+++ b/content/contributors/resources/git-workflow.pptx
@@ -107,7 +107,7 @@
   </p:defaultTextStyle>
   <p:extLst>
     <p:ext uri="{EFAFB233-063F-42B5-8137-9DF3F51BA10A}">
-      <p15:sldGuideLst xmlns:p15="http://schemas.microsoft.com/office/powerpoint/2012/main" xmlns=""/>
+      <p15:sldGuideLst xmlns="" xmlns:p15="http://schemas.microsoft.com/office/powerpoint/2012/main"/>
     </p:ext>
   </p:extLst>
 </p:presentation>
@@ -244,7 +244,7 @@
           <a:p>
             <a:fld id="{EA4A70C8-4F78-455D-BEBD-FAD3400884CB}" type="datetimeFigureOut">
               <a:rPr lang="en-US" smtClean="0"/>
-              <a:t>6/12/2013</a:t>
+              <a:t>10/16/2014</a:t>
             </a:fld>
             <a:endParaRPr lang="en-US"/>
           </a:p>
@@ -414,7 +414,7 @@
           <a:p>
             <a:fld id="{EA4A70C8-4F78-455D-BEBD-FAD3400884CB}" type="datetimeFigureOut">
               <a:rPr lang="en-US" smtClean="0"/>
-              <a:t>6/12/2013</a:t>
+              <a:t>10/16/2014</a:t>
             </a:fld>
             <a:endParaRPr lang="en-US"/>
           </a:p>
@@ -594,7 +594,7 @@
           <a:p>
             <a:fld id="{EA4A70C8-4F78-455D-BEBD-FAD3400884CB}" type="datetimeFigureOut">
               <a:rPr lang="en-US" smtClean="0"/>
-              <a:t>6/12/2013</a:t>
+              <a:t>10/16/2014</a:t>
             </a:fld>
             <a:endParaRPr lang="en-US"/>
           </a:p>
@@ -764,7 +764,7 @@
           <a:p>
             <a:fld id="{EA4A70C8-4F78-455D-BEBD-FAD3400884CB}" type="datetimeFigureOut">
               <a:rPr lang="en-US" smtClean="0"/>
-              <a:t>6/12/2013</a:t>
+              <a:t>10/16/2014</a:t>
             </a:fld>
             <a:endParaRPr lang="en-US"/>
           </a:p>
@@ -1010,7 +1010,7 @@
           <a:p>
             <a:fld id="{EA4A70C8-4F78-455D-BEBD-FAD3400884CB}" type="datetimeFigureOut">
               <a:rPr lang="en-US" smtClean="0"/>
-              <a:t>6/12/2013</a:t>
+              <a:t>10/16/2014</a:t>
             </a:fld>
             <a:endParaRPr lang="en-US"/>
           </a:p>
@@ -1242,7 +1242,7 @@
           <a:p>
             <a:fld id="{EA4A70C8-4F78-455D-BEBD-FAD3400884CB}" type="datetimeFigureOut">
               <a:rPr lang="en-US" smtClean="0"/>
-              <a:t>6/12/2013</a:t>
+              <a:t>10/16/2014</a:t>
             </a:fld>
             <a:endParaRPr lang="en-US"/>
           </a:p>
@@ -1609,7 +1609,7 @@
           <a:p>
             <a:fld id="{EA4A70C8-4F78-455D-BEBD-FAD3400884CB}" type="datetimeFigureOut">
               <a:rPr lang="en-US" smtClean="0"/>
-              <a:t>6/12/2013</a:t>
+              <a:t>10/16/2014</a:t>
             </a:fld>
             <a:endParaRPr lang="en-US"/>
           </a:p>
@@ -1727,7 +1727,7 @@
           <a:p>
             <a:fld id="{EA4A70C8-4F78-455D-BEBD-FAD3400884CB}" type="datetimeFigureOut">
               <a:rPr lang="en-US" smtClean="0"/>
-              <a:t>6/12/2013</a:t>
+              <a:t>10/16/2014</a:t>
             </a:fld>
             <a:endParaRPr lang="en-US"/>
           </a:p>
@@ -1822,7 +1822,7 @@
           <a:p>
             <a:fld id="{EA4A70C8-4F78-455D-BEBD-FAD3400884CB}" type="datetimeFigureOut">
               <a:rPr lang="en-US" smtClean="0"/>
-              <a:t>6/12/2013</a:t>
+              <a:t>10/16/2014</a:t>
             </a:fld>
             <a:endParaRPr lang="en-US"/>
           </a:p>
@@ -2099,7 +2099,7 @@
           <a:p>
             <a:fld id="{EA4A70C8-4F78-455D-BEBD-FAD3400884CB}" type="datetimeFigureOut">
               <a:rPr lang="en-US" smtClean="0"/>
-              <a:t>6/12/2013</a:t>
+              <a:t>10/16/2014</a:t>
             </a:fld>
             <a:endParaRPr lang="en-US"/>
           </a:p>
@@ -2352,7 +2352,7 @@
           <a:p>
             <a:fld id="{EA4A70C8-4F78-455D-BEBD-FAD3400884CB}" type="datetimeFigureOut">
               <a:rPr lang="en-US" smtClean="0"/>
-              <a:t>6/12/2013</a:t>
+              <a:t>10/16/2014</a:t>
             </a:fld>
             <a:endParaRPr lang="en-US"/>
           </a:p>
@@ -2565,7 +2565,7 @@
           <a:p>
             <a:fld id="{EA4A70C8-4F78-455D-BEBD-FAD3400884CB}" type="datetimeFigureOut">
               <a:rPr lang="en-US" smtClean="0"/>
-              <a:t>6/12/2013</a:t>
+              <a:t>10/16/2014</a:t>
             </a:fld>
             <a:endParaRPr lang="en-US"/>
           </a:p>
@@ -3607,8 +3607,8 @@
           </a:prstGeom>
           <a:ln w="28575">
             <a:solidFill>
-              <a:schemeClr val="bg2">
-                <a:lumMod val="75000"/>
+              <a:schemeClr val="bg1">
+                <a:lumMod val="50000"/>
               </a:schemeClr>
             </a:solidFill>
             <a:prstDash val="sysDot"/>
@@ -3690,8 +3690,8 @@
           </a:prstGeom>
           <a:ln w="28575">
             <a:solidFill>
-              <a:schemeClr val="bg2">
-                <a:lumMod val="75000"/>
+              <a:schemeClr val="bg1">
+                <a:lumMod val="50000"/>
               </a:schemeClr>
             </a:solidFill>
             <a:prstDash val="sysDot"/>
@@ -3758,18 +3758,18 @@
           <p:cNvPr id="42" name="Curved Connector 41"/>
           <p:cNvCxnSpPr>
             <a:stCxn id="7" idx="2"/>
-            <a:endCxn id="30" idx="3"/>
+            <a:endCxn id="9" idx="4"/>
           </p:cNvCxnSpPr>
           <p:nvPr/>
         </p:nvCxnSpPr>
         <p:spPr>
           <a:xfrm rot="10800000" flipV="1">
-            <a:off x="4890418" y="3384056"/>
-            <a:ext cx="1386083" cy="2286530"/>
+            <a:off x="2295836" y="3384055"/>
+            <a:ext cx="3980665" cy="2041943"/>
           </a:xfrm>
           <a:prstGeom prst="curvedConnector3">
             <a:avLst>
-              <a:gd name="adj1" fmla="val 71054"/>
+              <a:gd name="adj1" fmla="val 50000"/>
             </a:avLst>
           </a:prstGeom>
           <a:ln w="28575">
@@ -3800,8 +3800,8 @@
         </p:nvSpPr>
         <p:spPr>
           <a:xfrm>
-            <a:off x="5885879" y="2002796"/>
-            <a:ext cx="1182760" cy="307777"/>
+            <a:off x="5797715" y="2002796"/>
+            <a:ext cx="1359090" cy="307777"/>
           </a:xfrm>
           <a:prstGeom prst="rect">
             <a:avLst/>
@@ -3816,12 +3816,12 @@
           <a:p>
             <a:pPr algn="ctr"/>
             <a:r>
-              <a:rPr lang="en-GB" sz="1400" dirty="0"/>
-              <a:t>o</a:t>
-            </a:r>
-            <a:r>
-              <a:rPr lang="en-GB" sz="1400" dirty="0" smtClean="0"/>
-              <a:t>ne-time fork</a:t>
+              <a:rPr lang="en-GB" sz="1400" dirty="0" smtClean="0"/>
+              <a:t>1. one-time </a:t>
+            </a:r>
+            <a:r>
+              <a:rPr lang="en-GB" sz="1400" dirty="0" smtClean="0"/>
+              <a:t>fork</a:t>
             </a:r>
             <a:endParaRPr lang="en-US" sz="1400" dirty="0"/>
           </a:p>
@@ -3904,8 +3904,8 @@
         </p:nvSpPr>
         <p:spPr>
           <a:xfrm>
-            <a:off x="6467713" y="4165794"/>
-            <a:ext cx="766557" cy="307777"/>
+            <a:off x="6379548" y="4165794"/>
+            <a:ext cx="942887" cy="307777"/>
           </a:xfrm>
           <a:prstGeom prst="rect">
             <a:avLst/>
@@ -3920,8 +3920,16 @@
           <a:p>
             <a:pPr algn="ctr"/>
             <a:r>
-              <a:rPr lang="en-GB" sz="1400" dirty="0" smtClean="0"/>
-              <a:t>git push</a:t>
+              <a:rPr lang="en-GB" sz="1400" dirty="0"/>
+              <a:t>4</a:t>
+            </a:r>
+            <a:r>
+              <a:rPr lang="en-GB" sz="1400" dirty="0" smtClean="0"/>
+              <a:t>. git </a:t>
+            </a:r>
+            <a:r>
+              <a:rPr lang="en-GB" sz="1400" dirty="0" smtClean="0"/>
+              <a:t>push</a:t>
             </a:r>
             <a:endParaRPr lang="en-US" sz="1400" dirty="0"/>
           </a:p>
@@ -3972,8 +3980,8 @@
         </p:nvSpPr>
         <p:spPr>
           <a:xfrm>
-            <a:off x="5237034" y="5210310"/>
-            <a:ext cx="684804" cy="307777"/>
+            <a:off x="5148870" y="5210310"/>
+            <a:ext cx="861134" cy="307777"/>
           </a:xfrm>
           <a:prstGeom prst="rect">
             <a:avLst/>
@@ -3989,7 +3997,11 @@
             <a:pPr algn="ctr"/>
             <a:r>
               <a:rPr lang="en-GB" sz="1400" dirty="0" smtClean="0"/>
-              <a:t>git pull</a:t>
+              <a:t>3. git </a:t>
+            </a:r>
+            <a:r>
+              <a:rPr lang="en-GB" sz="1400" dirty="0" smtClean="0"/>
+              <a:t>pull</a:t>
             </a:r>
             <a:endParaRPr lang="en-US" sz="1400" dirty="0"/>
           </a:p>
@@ -4003,8 +4015,8 @@
         </p:nvSpPr>
         <p:spPr>
           <a:xfrm>
-            <a:off x="8246839" y="5053961"/>
-            <a:ext cx="853118" cy="523220"/>
+            <a:off x="8158675" y="5053961"/>
+            <a:ext cx="1029449" cy="523220"/>
           </a:xfrm>
           <a:prstGeom prst="rect">
             <a:avLst/>
@@ -4020,7 +4032,11 @@
             <a:pPr algn="ctr"/>
             <a:r>
               <a:rPr lang="en-GB" sz="1400" dirty="0" smtClean="0"/>
-              <a:t>one-time</a:t>
+              <a:t>2. one-time</a:t>
+            </a:r>
+            <a:r>
+              <a:rPr lang="en-GB" sz="1400" dirty="0" smtClean="0"/>
+              <a:t/>
             </a:r>
             <a:br>
               <a:rPr lang="en-GB" sz="1400" dirty="0" smtClean="0"/>
@@ -4079,7 +4095,7 @@
         </p:nvSpPr>
         <p:spPr>
           <a:xfrm>
-            <a:off x="3981740" y="4944972"/>
+            <a:off x="3767853" y="5795975"/>
             <a:ext cx="706244" cy="721531"/>
           </a:xfrm>
           <a:prstGeom prst="flowChartDocument">
@@ -4117,94 +4133,14 @@
       </p:sp>
       <p:sp>
         <p:nvSpPr>
-          <p:cNvPr id="30" name="Flowchart: Document 29"/>
-          <p:cNvSpPr/>
-          <p:nvPr/>
-        </p:nvSpPr>
-        <p:spPr>
-          <a:xfrm>
-            <a:off x="4322796" y="5413893"/>
-            <a:ext cx="567621" cy="513386"/>
-          </a:xfrm>
-          <a:prstGeom prst="flowChartDocument">
-            <a:avLst/>
-          </a:prstGeom>
-        </p:spPr>
-        <p:style>
-          <a:lnRef idx="2">
-            <a:schemeClr val="accent5">
-              <a:shade val="50000"/>
-            </a:schemeClr>
-          </a:lnRef>
-          <a:fillRef idx="1">
-            <a:schemeClr val="accent5"/>
-          </a:fillRef>
-          <a:effectRef idx="0">
-            <a:schemeClr val="accent5"/>
-          </a:effectRef>
-          <a:fontRef idx="minor">
-            <a:schemeClr val="lt1"/>
-          </a:fontRef>
-        </p:style>
-        <p:txBody>
-          <a:bodyPr rtlCol="0" anchor="ctr"/>
-          <a:lstStyle/>
-          <a:p>
-            <a:pPr algn="ctr"/>
-            <a:r>
-              <a:rPr lang="en-GB" sz="1100" dirty="0" smtClean="0"/>
-              <a:t>patch</a:t>
-            </a:r>
-            <a:endParaRPr lang="en-US" sz="1100" dirty="0"/>
-          </a:p>
-        </p:txBody>
-      </p:sp>
-      <p:cxnSp>
-        <p:nvCxnSpPr>
-          <p:cNvPr id="31" name="Curved Connector 30"/>
-          <p:cNvCxnSpPr/>
-          <p:nvPr/>
-        </p:nvCxnSpPr>
-        <p:spPr>
-          <a:xfrm rot="10800000" flipV="1">
-            <a:off x="2295836" y="5305737"/>
-            <a:ext cx="1685905" cy="120261"/>
-          </a:xfrm>
-          <a:prstGeom prst="curvedConnector3">
-            <a:avLst>
-              <a:gd name="adj1" fmla="val 50000"/>
-            </a:avLst>
-          </a:prstGeom>
-          <a:ln w="28575">
-            <a:prstDash val="dashDot"/>
-            <a:tailEnd type="triangle" w="lg" len="lg"/>
-          </a:ln>
-        </p:spPr>
-        <p:style>
-          <a:lnRef idx="1">
-            <a:schemeClr val="accent1"/>
-          </a:lnRef>
-          <a:fillRef idx="0">
-            <a:schemeClr val="accent1"/>
-          </a:fillRef>
-          <a:effectRef idx="0">
-            <a:schemeClr val="accent1"/>
-          </a:effectRef>
-          <a:fontRef idx="minor">
-            <a:schemeClr val="tx1"/>
-          </a:fontRef>
-        </p:style>
-      </p:cxnSp>
-      <p:sp>
-        <p:nvSpPr>
           <p:cNvPr id="32" name="TextBox 31"/>
           <p:cNvSpPr txBox="1"/>
           <p:nvPr/>
         </p:nvSpPr>
         <p:spPr>
           <a:xfrm>
-            <a:off x="2957017" y="4911803"/>
-            <a:ext cx="811441" cy="307777"/>
+            <a:off x="2449724" y="4620491"/>
+            <a:ext cx="1486176" cy="523220"/>
           </a:xfrm>
           <a:prstGeom prst="rect">
             <a:avLst/>
@@ -4219,8 +4155,96 @@
           <a:p>
             <a:pPr algn="ctr"/>
             <a:r>
-              <a:rPr lang="en-GB" sz="1400" dirty="0" smtClean="0"/>
-              <a:t>git apply</a:t>
+              <a:rPr lang="en-GB" sz="1400" dirty="0"/>
+              <a:t>7</a:t>
+            </a:r>
+            <a:r>
+              <a:rPr lang="en-GB" sz="1400" dirty="0" smtClean="0"/>
+              <a:t>. Review &amp; apply</a:t>
+            </a:r>
+            <a:br>
+              <a:rPr lang="en-GB" sz="1400" dirty="0" smtClean="0"/>
+            </a:br>
+            <a:r>
+              <a:rPr lang="en-GB" sz="1400" dirty="0" smtClean="0"/>
+              <a:t>pull request</a:t>
+            </a:r>
+            <a:endParaRPr lang="en-US" sz="1400" dirty="0"/>
+          </a:p>
+        </p:txBody>
+      </p:sp>
+      <p:sp>
+        <p:nvSpPr>
+          <p:cNvPr id="35" name="TextBox 34"/>
+          <p:cNvSpPr txBox="1"/>
+          <p:nvPr/>
+        </p:nvSpPr>
+        <p:spPr>
+          <a:xfrm>
+            <a:off x="3513162" y="5509263"/>
+            <a:ext cx="1185389" cy="307777"/>
+          </a:xfrm>
+          <a:prstGeom prst="rect">
+            <a:avLst/>
+          </a:prstGeom>
+          <a:noFill/>
+        </p:spPr>
+        <p:txBody>
+          <a:bodyPr wrap="none" rtlCol="0">
+            <a:spAutoFit/>
+          </a:bodyPr>
+          <a:lstStyle/>
+          <a:p>
+            <a:pPr algn="ctr"/>
+            <a:r>
+              <a:rPr lang="en-GB" sz="1400" dirty="0" smtClean="0"/>
+              <a:t>5. Create JIRA</a:t>
+            </a:r>
+            <a:endParaRPr lang="en-US" sz="1400" dirty="0"/>
+          </a:p>
+        </p:txBody>
+      </p:sp>
+      <p:sp>
+        <p:nvSpPr>
+          <p:cNvPr id="36" name="TextBox 35"/>
+          <p:cNvSpPr txBox="1"/>
+          <p:nvPr/>
+        </p:nvSpPr>
+        <p:spPr>
+          <a:xfrm>
+            <a:off x="4786893" y="5804889"/>
+            <a:ext cx="1219756" cy="523220"/>
+          </a:xfrm>
+          <a:prstGeom prst="rect">
+            <a:avLst/>
+          </a:prstGeom>
+          <a:noFill/>
+        </p:spPr>
+        <p:txBody>
+          <a:bodyPr wrap="none" rtlCol="0">
+            <a:spAutoFit/>
+          </a:bodyPr>
+          <a:lstStyle/>
+          <a:p>
+            <a:pPr algn="ctr"/>
+            <a:r>
+              <a:rPr lang="en-GB" sz="1400" dirty="0" smtClean="0"/>
+              <a:t>6. raise </a:t>
+            </a:r>
+            <a:r>
+              <a:rPr lang="en-GB" sz="1400" dirty="0" err="1" smtClean="0"/>
+              <a:t>github</a:t>
+            </a:r>
+            <a:r>
+              <a:rPr lang="en-GB" sz="1400" dirty="0"/>
+              <a:t/>
+            </a:r>
+            <a:br>
+              <a:rPr lang="en-GB" sz="1400" dirty="0"/>
+            </a:br>
+            <a:r>
+              <a:rPr lang="en-GB" sz="1400" dirty="0" smtClean="0"/>
+              <a:t>pull request</a:t>
             </a:r>
             <a:endParaRPr lang="en-US" sz="1400" dirty="0"/>
           </a:p>
@@ -4236,6 +4260,13 @@
   <p:clrMapOvr>
     <a:masterClrMapping/>
   </p:clrMapOvr>
+  <p:timing>
+    <p:tnLst>
+      <p:par>
+        <p:cTn id="1" dur="indefinite" restart="never" nodeType="tmRoot"/>
+      </p:par>
+    </p:tnLst>
+  </p:timing>
 </p:sld>
 </file>
 
@@ -5110,11 +5141,7 @@
             <a:pPr algn="ctr"/>
             <a:r>
               <a:rPr lang="en-GB" sz="1400" dirty="0" smtClean="0"/>
-              <a:t>git </a:t>
-            </a:r>
-            <a:r>
-              <a:rPr lang="en-GB" sz="1400" dirty="0" smtClean="0"/>
-              <a:t>format-patch</a:t>
+              <a:t>git format-patch</a:t>
             </a:r>
             <a:endParaRPr lang="en-US" sz="1400" dirty="0"/>
           </a:p>
@@ -5583,7 +5610,7 @@
   <a:extraClrSchemeLst/>
   <a:extLst>
     <a:ext uri="{05A4C25C-085E-4340-85A3-A5531E510DB2}">
-      <thm15:themeFamily xmlns:thm15="http://schemas.microsoft.com/office/thememl/2012/main" xmlns="" name="Office Theme" id="{62F939B6-93AF-4DB8-9C6B-D6C7DFDC589F}" vid="{4A3C46E8-61CC-4603-A589-7422A47A8E4A}"/>
+      <thm15:themeFamily xmlns="" xmlns:thm15="http://schemas.microsoft.com/office/thememl/2012/main" name="Office Theme" id="{62F939B6-93AF-4DB8-9C6B-D6C7DFDC589F}" vid="{4A3C46E8-61CC-4603-A589-7422A47A8E4A}"/>
     </a:ext>
   </a:extLst>
 </a:theme>

</xml_diff>